<commit_message>
update on task staus design task can be serach usign team member name search button added and also needs to shows the task with team member name
</commit_message>
<xml_diff>
--- a/TASKERMAN2.pptx
+++ b/TASKERMAN2.pptx
@@ -222,7 +222,7 @@
           <a:p>
             <a:fld id="{8D4635D1-1FD9-4CBD-ADED-743F1F4AA117}" type="datetimeFigureOut">
               <a:rPr lang="en-GB" smtClean="0"/>
-              <a:t>21/10/2015</a:t>
+              <a:t>24/10/2015</a:t>
             </a:fld>
             <a:endParaRPr lang="en-GB"/>
           </a:p>
@@ -1179,28 +1179,11 @@
               <a:rPr lang="en-GB" baseline="0" dirty="0" smtClean="0"/>
               <a:t>ID are auto assign if not provided. </a:t>
             </a:r>
-            <a:endParaRPr lang="en-GB" baseline="0" dirty="0" smtClean="0"/>
           </a:p>
           <a:p>
             <a:r>
               <a:rPr lang="en-GB" baseline="0" dirty="0" smtClean="0"/>
-              <a:t>if </a:t>
-            </a:r>
-            <a:r>
-              <a:rPr lang="en-GB" baseline="0" dirty="0" smtClean="0"/>
-              <a:t>the user provides the ID that has been already used then </a:t>
-            </a:r>
-            <a:r>
-              <a:rPr lang="en-GB" baseline="0" dirty="0" smtClean="0"/>
-              <a:t>the should output </a:t>
-            </a:r>
-            <a:r>
-              <a:rPr lang="en-GB" baseline="0" dirty="0" smtClean="0"/>
-              <a:t>error</a:t>
-            </a:r>
-            <a:r>
-              <a:rPr lang="en-GB" baseline="0" dirty="0" smtClean="0"/>
-              <a:t>.</a:t>
+              <a:t>if the user provides the ID that has been already used then the should output error.</a:t>
             </a:r>
           </a:p>
           <a:p>
@@ -1303,19 +1286,7 @@
             </a:r>
             <a:r>
               <a:rPr lang="en-GB" baseline="0" dirty="0" smtClean="0"/>
-              <a:t> delete employee the admin can use the </a:t>
-            </a:r>
-            <a:r>
-              <a:rPr lang="en-GB" baseline="0" dirty="0" smtClean="0"/>
-              <a:t>field, ID, First name or Last name and </a:t>
-            </a:r>
-            <a:r>
-              <a:rPr lang="en-GB" baseline="0" dirty="0" smtClean="0"/>
-              <a:t>use the search </a:t>
-            </a:r>
-            <a:r>
-              <a:rPr lang="en-GB" baseline="0" dirty="0" smtClean="0"/>
-              <a:t>button to search the user. </a:t>
+              <a:t> delete employee the admin can use the field, ID, First name or Last name and use the search button to search the user. </a:t>
             </a:r>
           </a:p>
           <a:p>
@@ -1327,19 +1298,7 @@
           <a:p>
             <a:r>
               <a:rPr lang="en-GB" baseline="0" dirty="0" smtClean="0"/>
-              <a:t>now </a:t>
-            </a:r>
-            <a:r>
-              <a:rPr lang="en-GB" baseline="0" dirty="0" smtClean="0"/>
-              <a:t>admin can choose the name </a:t>
-            </a:r>
-            <a:r>
-              <a:rPr lang="en-GB" baseline="0" dirty="0" smtClean="0"/>
-              <a:t>from result and </a:t>
-            </a:r>
-            <a:r>
-              <a:rPr lang="en-GB" baseline="0" dirty="0" smtClean="0"/>
-              <a:t>use the delete option to delete the name from the database.</a:t>
+              <a:t>now admin can choose the name from result and use the delete option to delete the name from the database.</a:t>
             </a:r>
           </a:p>
         </p:txBody>
@@ -1436,53 +1395,25 @@
           <a:p>
             <a:r>
               <a:rPr lang="en-GB" baseline="0" dirty="0" smtClean="0"/>
-              <a:t>Task(text box)– </a:t>
-            </a:r>
+              <a:t>Task(text box)– add task that needs to be performed for the project completion.</a:t>
+            </a:r>
+          </a:p>
+          <a:p>
             <a:r>
               <a:rPr lang="en-GB" baseline="0" dirty="0" smtClean="0"/>
-              <a:t>add task that needs to be performed for the project completion.</a:t>
+              <a:t>Task member (drop down list)-adds the task members that needs to work on it.</a:t>
             </a:r>
           </a:p>
           <a:p>
             <a:r>
               <a:rPr lang="en-GB" baseline="0" dirty="0" smtClean="0"/>
-              <a:t>Task member </a:t>
-            </a:r>
+              <a:t>Start date (calendar)– time the task needs to be started</a:t>
+            </a:r>
+          </a:p>
+          <a:p>
             <a:r>
               <a:rPr lang="en-GB" baseline="0" dirty="0" smtClean="0"/>
-              <a:t>(drop down list)-adds </a:t>
-            </a:r>
-            <a:r>
-              <a:rPr lang="en-GB" baseline="0" dirty="0" smtClean="0"/>
-              <a:t>the task members that needs to work on it.</a:t>
-            </a:r>
-          </a:p>
-          <a:p>
-            <a:r>
-              <a:rPr lang="en-GB" baseline="0" dirty="0" smtClean="0"/>
-              <a:t>Start date </a:t>
-            </a:r>
-            <a:r>
-              <a:rPr lang="en-GB" baseline="0" dirty="0" smtClean="0"/>
-              <a:t>(calendar)– </a:t>
-            </a:r>
-            <a:r>
-              <a:rPr lang="en-GB" baseline="0" dirty="0" smtClean="0"/>
-              <a:t>time the task needs to be started</a:t>
-            </a:r>
-          </a:p>
-          <a:p>
-            <a:r>
-              <a:rPr lang="en-GB" baseline="0" dirty="0" smtClean="0"/>
-              <a:t>Completion </a:t>
-            </a:r>
-            <a:r>
-              <a:rPr lang="en-GB" baseline="0" dirty="0" smtClean="0"/>
-              <a:t>date (calendar)–  </a:t>
-            </a:r>
-            <a:r>
-              <a:rPr lang="en-GB" baseline="0" dirty="0" smtClean="0"/>
-              <a:t>when the task needs to be complete in.</a:t>
+              <a:t>Completion date (calendar)–  when the task needs to be complete in.</a:t>
             </a:r>
           </a:p>
           <a:p>
@@ -1683,11 +1614,7 @@
           <a:p>
             <a:r>
               <a:rPr lang="en-GB" baseline="0" dirty="0" smtClean="0"/>
-              <a:t>“+” allows admin to add multiple </a:t>
-            </a:r>
-            <a:r>
-              <a:rPr lang="en-GB" baseline="0" dirty="0" smtClean="0"/>
-              <a:t>task member for the specified task.</a:t>
+              <a:t>“+” allows admin to add multiple task member for the specified task.</a:t>
             </a:r>
             <a:endParaRPr lang="en-GB" dirty="0"/>
           </a:p>
@@ -1792,15 +1719,7 @@
           <a:p>
             <a:r>
               <a:rPr lang="en-GB" baseline="0" dirty="0" smtClean="0"/>
-              <a:t>Task Status (drop down list) </a:t>
-            </a:r>
-            <a:r>
-              <a:rPr lang="en-GB" baseline="0" dirty="0" smtClean="0"/>
-              <a:t>– is the task complete, ongoing or due to some reason </a:t>
-            </a:r>
-            <a:r>
-              <a:rPr lang="en-GB" baseline="0" dirty="0" smtClean="0"/>
-              <a:t>abandoned ? Admin is allowed select one status for the task from 3 selection </a:t>
+              <a:t>Task Status (drop down list) – is the task complete, ongoing or due to some reason abandoned ? Admin is allowed select one status for the task from 3 selection </a:t>
             </a:r>
           </a:p>
           <a:p>
@@ -1818,8 +1737,25 @@
           <a:p>
             <a:r>
               <a:rPr lang="en-GB" baseline="0" dirty="0" smtClean="0"/>
-              <a:t>ongoing</a:t>
-            </a:r>
+              <a:t>Ongoing</a:t>
+            </a:r>
+          </a:p>
+          <a:p>
+            <a:r>
+              <a:rPr lang="en-GB" baseline="0" dirty="0" smtClean="0"/>
+              <a:t>Admin can also search the task using task member names and using search button </a:t>
+            </a:r>
+          </a:p>
+          <a:p>
+            <a:r>
+              <a:rPr lang="en-GB" baseline="0" dirty="0" smtClean="0"/>
+              <a:t>The should shown should be sorted by expected completion date.</a:t>
+            </a:r>
+          </a:p>
+          <a:p>
+            <a:endParaRPr lang="en-GB" baseline="0" dirty="0" smtClean="0"/>
+          </a:p>
+          <a:p>
             <a:endParaRPr lang="en-GB" baseline="0" dirty="0" smtClean="0"/>
           </a:p>
           <a:p>
@@ -1994,7 +1930,7 @@
           <a:p>
             <a:fld id="{6881A770-2687-463F-9BE5-03E627E2199A}" type="datetimeFigureOut">
               <a:rPr lang="en-GB" smtClean="0"/>
-              <a:t>21/10/2015</a:t>
+              <a:t>24/10/2015</a:t>
             </a:fld>
             <a:endParaRPr lang="en-GB"/>
           </a:p>
@@ -2164,7 +2100,7 @@
           <a:p>
             <a:fld id="{6881A770-2687-463F-9BE5-03E627E2199A}" type="datetimeFigureOut">
               <a:rPr lang="en-GB" smtClean="0"/>
-              <a:t>21/10/2015</a:t>
+              <a:t>24/10/2015</a:t>
             </a:fld>
             <a:endParaRPr lang="en-GB"/>
           </a:p>
@@ -2344,7 +2280,7 @@
           <a:p>
             <a:fld id="{6881A770-2687-463F-9BE5-03E627E2199A}" type="datetimeFigureOut">
               <a:rPr lang="en-GB" smtClean="0"/>
-              <a:t>21/10/2015</a:t>
+              <a:t>24/10/2015</a:t>
             </a:fld>
             <a:endParaRPr lang="en-GB"/>
           </a:p>
@@ -2514,7 +2450,7 @@
           <a:p>
             <a:fld id="{6881A770-2687-463F-9BE5-03E627E2199A}" type="datetimeFigureOut">
               <a:rPr lang="en-GB" smtClean="0"/>
-              <a:t>21/10/2015</a:t>
+              <a:t>24/10/2015</a:t>
             </a:fld>
             <a:endParaRPr lang="en-GB"/>
           </a:p>
@@ -2760,7 +2696,7 @@
           <a:p>
             <a:fld id="{6881A770-2687-463F-9BE5-03E627E2199A}" type="datetimeFigureOut">
               <a:rPr lang="en-GB" smtClean="0"/>
-              <a:t>21/10/2015</a:t>
+              <a:t>24/10/2015</a:t>
             </a:fld>
             <a:endParaRPr lang="en-GB"/>
           </a:p>
@@ -2992,7 +2928,7 @@
           <a:p>
             <a:fld id="{6881A770-2687-463F-9BE5-03E627E2199A}" type="datetimeFigureOut">
               <a:rPr lang="en-GB" smtClean="0"/>
-              <a:t>21/10/2015</a:t>
+              <a:t>24/10/2015</a:t>
             </a:fld>
             <a:endParaRPr lang="en-GB"/>
           </a:p>
@@ -3359,7 +3295,7 @@
           <a:p>
             <a:fld id="{6881A770-2687-463F-9BE5-03E627E2199A}" type="datetimeFigureOut">
               <a:rPr lang="en-GB" smtClean="0"/>
-              <a:t>21/10/2015</a:t>
+              <a:t>24/10/2015</a:t>
             </a:fld>
             <a:endParaRPr lang="en-GB"/>
           </a:p>
@@ -3477,7 +3413,7 @@
           <a:p>
             <a:fld id="{6881A770-2687-463F-9BE5-03E627E2199A}" type="datetimeFigureOut">
               <a:rPr lang="en-GB" smtClean="0"/>
-              <a:t>21/10/2015</a:t>
+              <a:t>24/10/2015</a:t>
             </a:fld>
             <a:endParaRPr lang="en-GB"/>
           </a:p>
@@ -3572,7 +3508,7 @@
           <a:p>
             <a:fld id="{6881A770-2687-463F-9BE5-03E627E2199A}" type="datetimeFigureOut">
               <a:rPr lang="en-GB" smtClean="0"/>
-              <a:t>21/10/2015</a:t>
+              <a:t>24/10/2015</a:t>
             </a:fld>
             <a:endParaRPr lang="en-GB"/>
           </a:p>
@@ -3849,7 +3785,7 @@
           <a:p>
             <a:fld id="{6881A770-2687-463F-9BE5-03E627E2199A}" type="datetimeFigureOut">
               <a:rPr lang="en-GB" smtClean="0"/>
-              <a:t>21/10/2015</a:t>
+              <a:t>24/10/2015</a:t>
             </a:fld>
             <a:endParaRPr lang="en-GB"/>
           </a:p>
@@ -4102,7 +4038,7 @@
           <a:p>
             <a:fld id="{6881A770-2687-463F-9BE5-03E627E2199A}" type="datetimeFigureOut">
               <a:rPr lang="en-GB" smtClean="0"/>
-              <a:t>21/10/2015</a:t>
+              <a:t>24/10/2015</a:t>
             </a:fld>
             <a:endParaRPr lang="en-GB"/>
           </a:p>
@@ -4315,7 +4251,7 @@
           <a:p>
             <a:fld id="{6881A770-2687-463F-9BE5-03E627E2199A}" type="datetimeFigureOut">
               <a:rPr lang="en-GB" smtClean="0"/>
-              <a:t>21/10/2015</a:t>
+              <a:t>24/10/2015</a:t>
             </a:fld>
             <a:endParaRPr lang="en-GB"/>
           </a:p>
@@ -5863,20 +5799,23 @@
           <a:bodyPr rtlCol="0" anchor="ctr"/>
           <a:lstStyle/>
           <a:p>
+            <a:r>
+              <a:rPr lang="en-GB" sz="1400" dirty="0" smtClean="0"/>
+              <a:t> </a:t>
+            </a:r>
+            <a:r>
+              <a:rPr lang="en-GB" sz="1400" dirty="0"/>
+              <a:t>Task </a:t>
+            </a:r>
+            <a:r>
+              <a:rPr lang="en-GB" sz="1400" dirty="0" smtClean="0"/>
+              <a:t>Member: Bob Jims (Programmer</a:t>
+            </a:r>
+            <a:r>
+              <a:rPr lang="en-GB" sz="1400" dirty="0" smtClean="0"/>
+              <a:t>)</a:t>
+            </a:r>
             <a:endParaRPr lang="en-GB" sz="1400" dirty="0" smtClean="0"/>
-          </a:p>
-          <a:p>
-            <a:r>
-              <a:rPr lang="en-GB" sz="1400" dirty="0" smtClean="0"/>
-              <a:t>Task Member: Bob Jims (Programmer)</a:t>
-            </a:r>
-          </a:p>
-          <a:p>
-            <a:r>
-              <a:rPr lang="en-GB" dirty="0" smtClean="0"/>
-              <a:t>  </a:t>
-            </a:r>
-            <a:endParaRPr lang="en-GB" dirty="0"/>
           </a:p>
         </p:txBody>
       </p:sp>
@@ -7586,14 +7525,14 @@
           <p:nvPr>
             <p:extLst>
               <p:ext uri="{D42A27DB-BD31-4B8C-83A1-F6EECF244321}">
-                <p14:modId xmlns:p14="http://schemas.microsoft.com/office/powerpoint/2010/main" val="4145132459"/>
+                <p14:modId xmlns:p14="http://schemas.microsoft.com/office/powerpoint/2010/main" val="2464251173"/>
               </p:ext>
             </p:extLst>
           </p:nvPr>
         </p:nvGraphicFramePr>
         <p:xfrm>
           <a:off x="3751074" y="3237596"/>
-          <a:ext cx="7433156" cy="2651760"/>
+          <a:ext cx="7433156" cy="3566160"/>
         </p:xfrm>
         <a:graphic>
           <a:graphicData uri="http://schemas.openxmlformats.org/drawingml/2006/table">
@@ -7685,9 +7624,46 @@
                       </a:r>
                       <a:r>
                         <a:rPr lang="en-GB" baseline="0" dirty="0" smtClean="0"/>
-                        <a:t> the application login.</a:t>
+                        <a:t> the application login</a:t>
                       </a:r>
-                      <a:endParaRPr lang="en-GB" dirty="0"/>
+                      <a:r>
+                        <a:rPr lang="en-GB" baseline="0" dirty="0" smtClean="0"/>
+                        <a:t>.</a:t>
+                      </a:r>
+                    </a:p>
+                    <a:p>
+                      <a:r>
+                        <a:rPr lang="en-GB" baseline="0" dirty="0" smtClean="0"/>
+                        <a:t>Team member:</a:t>
+                      </a:r>
+                    </a:p>
+                    <a:p>
+                      <a:pPr marL="0" marR="0" indent="0" algn="l" defTabSz="914400" rtl="0" eaLnBrk="1" fontAlgn="auto" latinLnBrk="0" hangingPunct="1">
+                        <a:lnSpc>
+                          <a:spcPct val="100000"/>
+                        </a:lnSpc>
+                        <a:spcBef>
+                          <a:spcPts val="0"/>
+                        </a:spcBef>
+                        <a:spcAft>
+                          <a:spcPts val="0"/>
+                        </a:spcAft>
+                        <a:buClrTx/>
+                        <a:buSzTx/>
+                        <a:buFontTx/>
+                        <a:buNone/>
+                        <a:tabLst/>
+                        <a:defRPr/>
+                      </a:pPr>
+                      <a:r>
+                        <a:rPr lang="en-GB" dirty="0" smtClean="0"/>
+                        <a:t>Jute Ron</a:t>
+                      </a:r>
+                      <a:r>
+                        <a:rPr lang="en-GB" baseline="0" dirty="0" smtClean="0"/>
+                        <a:t>, Ron Egg, Fish Simon </a:t>
+                      </a:r>
+                      <a:endParaRPr lang="en-GB" dirty="0" smtClean="0"/>
                     </a:p>
                   </a:txBody>
                   <a:tcPr/>
@@ -7747,9 +7723,44 @@
                       </a:r>
                       <a:r>
                         <a:rPr lang="en-GB" baseline="0" dirty="0" smtClean="0"/>
-                        <a:t> the login webpage for website</a:t>
+                        <a:t> the login webpage for </a:t>
                       </a:r>
-                      <a:endParaRPr lang="en-GB" dirty="0"/>
+                      <a:r>
+                        <a:rPr lang="en-GB" baseline="0" dirty="0" smtClean="0"/>
+                        <a:t>website</a:t>
+                      </a:r>
+                    </a:p>
+                    <a:p>
+                      <a:r>
+                        <a:rPr lang="en-GB" baseline="0" dirty="0" smtClean="0"/>
+                        <a:t>Team member</a:t>
+                      </a:r>
+                    </a:p>
+                    <a:p>
+                      <a:pPr marL="0" marR="0" indent="0" algn="l" defTabSz="914400" rtl="0" eaLnBrk="1" fontAlgn="auto" latinLnBrk="0" hangingPunct="1">
+                        <a:lnSpc>
+                          <a:spcPct val="100000"/>
+                        </a:lnSpc>
+                        <a:spcBef>
+                          <a:spcPts val="0"/>
+                        </a:spcBef>
+                        <a:spcAft>
+                          <a:spcPts val="0"/>
+                        </a:spcAft>
+                        <a:buClrTx/>
+                        <a:buSzTx/>
+                        <a:buFontTx/>
+                        <a:buNone/>
+                        <a:tabLst/>
+                        <a:defRPr/>
+                      </a:pPr>
+                      <a:r>
+                        <a:rPr lang="en-GB" dirty="0" smtClean="0"/>
+                        <a:t>Jute Ron, Sam Smith</a:t>
+                      </a:r>
+                    </a:p>
+                    <a:p>
+                      <a:endParaRPr lang="en-GB" b="1" dirty="0"/>
                     </a:p>
                   </a:txBody>
                   <a:tcPr/>
@@ -7797,90 +7808,6 @@
                   <a:tcPr/>
                 </a:tc>
               </a:tr>
-              <a:tr h="282316">
-                <a:tc>
-                  <a:txBody>
-                    <a:bodyPr/>
-                    <a:lstStyle/>
-                    <a:p>
-                      <a:endParaRPr lang="en-GB" dirty="0"/>
-                    </a:p>
-                  </a:txBody>
-                  <a:tcPr/>
-                </a:tc>
-                <a:tc>
-                  <a:txBody>
-                    <a:bodyPr/>
-                    <a:lstStyle/>
-                    <a:p>
-                      <a:endParaRPr lang="en-GB"/>
-                    </a:p>
-                  </a:txBody>
-                  <a:tcPr/>
-                </a:tc>
-                <a:tc>
-                  <a:txBody>
-                    <a:bodyPr/>
-                    <a:lstStyle/>
-                    <a:p>
-                      <a:endParaRPr lang="en-GB" dirty="0"/>
-                    </a:p>
-                  </a:txBody>
-                  <a:tcPr/>
-                </a:tc>
-                <a:tc>
-                  <a:txBody>
-                    <a:bodyPr/>
-                    <a:lstStyle/>
-                    <a:p>
-                      <a:endParaRPr lang="en-GB" dirty="0"/>
-                    </a:p>
-                  </a:txBody>
-                  <a:tcPr/>
-                </a:tc>
-              </a:tr>
-              <a:tr h="282316">
-                <a:tc>
-                  <a:txBody>
-                    <a:bodyPr/>
-                    <a:lstStyle/>
-                    <a:p>
-                      <a:endParaRPr lang="en-GB" dirty="0"/>
-                    </a:p>
-                  </a:txBody>
-                  <a:tcPr/>
-                </a:tc>
-                <a:tc>
-                  <a:txBody>
-                    <a:bodyPr/>
-                    <a:lstStyle/>
-                    <a:p>
-                      <a:endParaRPr lang="en-GB"/>
-                    </a:p>
-                  </a:txBody>
-                  <a:tcPr/>
-                </a:tc>
-                <a:tc>
-                  <a:txBody>
-                    <a:bodyPr/>
-                    <a:lstStyle/>
-                    <a:p>
-                      <a:endParaRPr lang="en-GB" dirty="0"/>
-                    </a:p>
-                  </a:txBody>
-                  <a:tcPr/>
-                </a:tc>
-                <a:tc>
-                  <a:txBody>
-                    <a:bodyPr/>
-                    <a:lstStyle/>
-                    <a:p>
-                      <a:endParaRPr lang="en-GB" dirty="0"/>
-                    </a:p>
-                  </a:txBody>
-                  <a:tcPr/>
-                </a:tc>
-              </a:tr>
             </a:tbl>
           </a:graphicData>
         </a:graphic>
@@ -8057,6 +7984,146 @@
         <p:spPr>
           <a:xfrm>
             <a:off x="10298548" y="1905932"/>
+            <a:ext cx="304800" cy="265084"/>
+          </a:xfrm>
+          <a:prstGeom prst="downArrow">
+            <a:avLst/>
+          </a:prstGeom>
+          <a:solidFill>
+            <a:srgbClr val="FF0000"/>
+          </a:solidFill>
+        </p:spPr>
+        <p:style>
+          <a:lnRef idx="2">
+            <a:schemeClr val="accent1">
+              <a:shade val="50000"/>
+            </a:schemeClr>
+          </a:lnRef>
+          <a:fillRef idx="1">
+            <a:schemeClr val="accent1"/>
+          </a:fillRef>
+          <a:effectRef idx="0">
+            <a:schemeClr val="accent1"/>
+          </a:effectRef>
+          <a:fontRef idx="minor">
+            <a:schemeClr val="lt1"/>
+          </a:fontRef>
+        </p:style>
+        <p:txBody>
+          <a:bodyPr rtlCol="0" anchor="ctr"/>
+          <a:lstStyle/>
+          <a:p>
+            <a:pPr algn="ctr"/>
+            <a:endParaRPr lang="en-GB"/>
+          </a:p>
+        </p:txBody>
+      </p:sp>
+      <p:sp>
+        <p:nvSpPr>
+          <p:cNvPr id="32" name="Rectangle 31"/>
+          <p:cNvSpPr/>
+          <p:nvPr/>
+        </p:nvSpPr>
+        <p:spPr>
+          <a:xfrm>
+            <a:off x="8266932" y="2436022"/>
+            <a:ext cx="939800" cy="275266"/>
+          </a:xfrm>
+          <a:prstGeom prst="rect">
+            <a:avLst/>
+          </a:prstGeom>
+        </p:spPr>
+        <p:style>
+          <a:lnRef idx="0">
+            <a:schemeClr val="accent6"/>
+          </a:lnRef>
+          <a:fillRef idx="3">
+            <a:schemeClr val="accent6"/>
+          </a:fillRef>
+          <a:effectRef idx="3">
+            <a:schemeClr val="accent6"/>
+          </a:effectRef>
+          <a:fontRef idx="minor">
+            <a:schemeClr val="lt1"/>
+          </a:fontRef>
+        </p:style>
+        <p:txBody>
+          <a:bodyPr rtlCol="0" anchor="ctr"/>
+          <a:lstStyle/>
+          <a:p>
+            <a:pPr algn="ctr"/>
+            <a:r>
+              <a:rPr lang="en-GB" dirty="0" smtClean="0"/>
+              <a:t>Search</a:t>
+            </a:r>
+            <a:endParaRPr lang="en-GB" dirty="0"/>
+          </a:p>
+        </p:txBody>
+      </p:sp>
+      <p:sp>
+        <p:nvSpPr>
+          <p:cNvPr id="33" name="Rounded Rectangle 32"/>
+          <p:cNvSpPr/>
+          <p:nvPr/>
+        </p:nvSpPr>
+        <p:spPr>
+          <a:xfrm>
+            <a:off x="3891635" y="2808561"/>
+            <a:ext cx="3204448" cy="377767"/>
+          </a:xfrm>
+          <a:prstGeom prst="roundRect">
+            <a:avLst/>
+          </a:prstGeom>
+          <a:solidFill>
+            <a:schemeClr val="tx1"/>
+          </a:solidFill>
+        </p:spPr>
+        <p:style>
+          <a:lnRef idx="2">
+            <a:schemeClr val="accent1">
+              <a:shade val="50000"/>
+            </a:schemeClr>
+          </a:lnRef>
+          <a:fillRef idx="1">
+            <a:schemeClr val="accent1"/>
+          </a:fillRef>
+          <a:effectRef idx="0">
+            <a:schemeClr val="accent1"/>
+          </a:effectRef>
+          <a:fontRef idx="minor">
+            <a:schemeClr val="lt1"/>
+          </a:fontRef>
+        </p:style>
+        <p:txBody>
+          <a:bodyPr rtlCol="0" anchor="ctr"/>
+          <a:lstStyle/>
+          <a:p>
+            <a:endParaRPr lang="en-GB" sz="1400" dirty="0" smtClean="0"/>
+          </a:p>
+          <a:p>
+            <a:r>
+              <a:rPr lang="en-GB" sz="1400" dirty="0" smtClean="0"/>
+              <a:t>Task Member: Bob Jims (Programmer)</a:t>
+            </a:r>
+          </a:p>
+          <a:p>
+            <a:r>
+              <a:rPr lang="en-GB" dirty="0" smtClean="0"/>
+              <a:t>  </a:t>
+            </a:r>
+            <a:endParaRPr lang="en-GB" dirty="0"/>
+          </a:p>
+        </p:txBody>
+      </p:sp>
+      <p:sp>
+        <p:nvSpPr>
+          <p:cNvPr id="39" name="Down Arrow 38"/>
+          <p:cNvSpPr/>
+          <p:nvPr/>
+        </p:nvSpPr>
+        <p:spPr>
+          <a:xfrm>
+            <a:off x="6797585" y="2892793"/>
             <a:ext cx="304800" cy="265084"/>
           </a:xfrm>
           <a:prstGeom prst="downArrow">
@@ -9171,12 +9238,16 @@
             <a:graphicFrameLocks/>
           </p:cNvGraphicFramePr>
           <p:nvPr>
-            <p:extLst/>
+            <p:extLst>
+              <p:ext uri="{D42A27DB-BD31-4B8C-83A1-F6EECF244321}">
+                <p14:modId xmlns:p14="http://schemas.microsoft.com/office/powerpoint/2010/main" val="3828490285"/>
+              </p:ext>
+            </p:extLst>
           </p:nvPr>
         </p:nvGraphicFramePr>
         <p:xfrm>
           <a:off x="3751074" y="3237596"/>
-          <a:ext cx="7433156" cy="2651760"/>
+          <a:ext cx="7433156" cy="3566160"/>
         </p:xfrm>
         <a:graphic>
           <a:graphicData uri="http://schemas.openxmlformats.org/drawingml/2006/table">
@@ -9268,9 +9339,46 @@
                       </a:r>
                       <a:r>
                         <a:rPr lang="en-GB" baseline="0" dirty="0" smtClean="0"/>
-                        <a:t> the application login.</a:t>
+                        <a:t> the application login</a:t>
                       </a:r>
-                      <a:endParaRPr lang="en-GB" dirty="0"/>
+                      <a:r>
+                        <a:rPr lang="en-GB" baseline="0" dirty="0" smtClean="0"/>
+                        <a:t>.</a:t>
+                      </a:r>
+                    </a:p>
+                    <a:p>
+                      <a:r>
+                        <a:rPr lang="en-GB" baseline="0" dirty="0" smtClean="0"/>
+                        <a:t>Team member:</a:t>
+                      </a:r>
+                    </a:p>
+                    <a:p>
+                      <a:pPr marL="0" marR="0" indent="0" algn="l" defTabSz="914400" rtl="0" eaLnBrk="1" fontAlgn="auto" latinLnBrk="0" hangingPunct="1">
+                        <a:lnSpc>
+                          <a:spcPct val="100000"/>
+                        </a:lnSpc>
+                        <a:spcBef>
+                          <a:spcPts val="0"/>
+                        </a:spcBef>
+                        <a:spcAft>
+                          <a:spcPts val="0"/>
+                        </a:spcAft>
+                        <a:buClrTx/>
+                        <a:buSzTx/>
+                        <a:buFontTx/>
+                        <a:buNone/>
+                        <a:tabLst/>
+                        <a:defRPr/>
+                      </a:pPr>
+                      <a:r>
+                        <a:rPr lang="en-GB" dirty="0" smtClean="0"/>
+                        <a:t>Jute Ron</a:t>
+                      </a:r>
+                      <a:r>
+                        <a:rPr lang="en-GB" baseline="0" dirty="0" smtClean="0"/>
+                        <a:t>, Ron Egg, Fish Simon </a:t>
+                      </a:r>
+                      <a:endParaRPr lang="en-GB" dirty="0" smtClean="0"/>
                     </a:p>
                   </a:txBody>
                   <a:tcPr/>
@@ -9330,9 +9438,44 @@
                       </a:r>
                       <a:r>
                         <a:rPr lang="en-GB" baseline="0" dirty="0" smtClean="0"/>
-                        <a:t> the login webpage for website</a:t>
+                        <a:t> the login webpage for </a:t>
                       </a:r>
-                      <a:endParaRPr lang="en-GB" dirty="0"/>
+                      <a:r>
+                        <a:rPr lang="en-GB" baseline="0" dirty="0" smtClean="0"/>
+                        <a:t>website</a:t>
+                      </a:r>
+                    </a:p>
+                    <a:p>
+                      <a:r>
+                        <a:rPr lang="en-GB" baseline="0" dirty="0" smtClean="0"/>
+                        <a:t>Team member:</a:t>
+                      </a:r>
+                    </a:p>
+                    <a:p>
+                      <a:pPr marL="0" marR="0" indent="0" algn="l" defTabSz="914400" rtl="0" eaLnBrk="1" fontAlgn="auto" latinLnBrk="0" hangingPunct="1">
+                        <a:lnSpc>
+                          <a:spcPct val="100000"/>
+                        </a:lnSpc>
+                        <a:spcBef>
+                          <a:spcPts val="0"/>
+                        </a:spcBef>
+                        <a:spcAft>
+                          <a:spcPts val="0"/>
+                        </a:spcAft>
+                        <a:buClrTx/>
+                        <a:buSzTx/>
+                        <a:buFontTx/>
+                        <a:buNone/>
+                        <a:tabLst/>
+                        <a:defRPr/>
+                      </a:pPr>
+                      <a:r>
+                        <a:rPr lang="en-GB" dirty="0" smtClean="0"/>
+                        <a:t>Jute Ron, Sam Smith</a:t>
+                      </a:r>
+                    </a:p>
+                    <a:p>
+                      <a:endParaRPr lang="en-GB" b="1" dirty="0"/>
                     </a:p>
                   </a:txBody>
                   <a:tcPr/>
@@ -9380,90 +9523,6 @@
                   <a:tcPr/>
                 </a:tc>
               </a:tr>
-              <a:tr h="282316">
-                <a:tc>
-                  <a:txBody>
-                    <a:bodyPr/>
-                    <a:lstStyle/>
-                    <a:p>
-                      <a:endParaRPr lang="en-GB" dirty="0"/>
-                    </a:p>
-                  </a:txBody>
-                  <a:tcPr/>
-                </a:tc>
-                <a:tc>
-                  <a:txBody>
-                    <a:bodyPr/>
-                    <a:lstStyle/>
-                    <a:p>
-                      <a:endParaRPr lang="en-GB"/>
-                    </a:p>
-                  </a:txBody>
-                  <a:tcPr/>
-                </a:tc>
-                <a:tc>
-                  <a:txBody>
-                    <a:bodyPr/>
-                    <a:lstStyle/>
-                    <a:p>
-                      <a:endParaRPr lang="en-GB" dirty="0"/>
-                    </a:p>
-                  </a:txBody>
-                  <a:tcPr/>
-                </a:tc>
-                <a:tc>
-                  <a:txBody>
-                    <a:bodyPr/>
-                    <a:lstStyle/>
-                    <a:p>
-                      <a:endParaRPr lang="en-GB" dirty="0"/>
-                    </a:p>
-                  </a:txBody>
-                  <a:tcPr/>
-                </a:tc>
-              </a:tr>
-              <a:tr h="282316">
-                <a:tc>
-                  <a:txBody>
-                    <a:bodyPr/>
-                    <a:lstStyle/>
-                    <a:p>
-                      <a:endParaRPr lang="en-GB" dirty="0"/>
-                    </a:p>
-                  </a:txBody>
-                  <a:tcPr/>
-                </a:tc>
-                <a:tc>
-                  <a:txBody>
-                    <a:bodyPr/>
-                    <a:lstStyle/>
-                    <a:p>
-                      <a:endParaRPr lang="en-GB" dirty="0"/>
-                    </a:p>
-                  </a:txBody>
-                  <a:tcPr/>
-                </a:tc>
-                <a:tc>
-                  <a:txBody>
-                    <a:bodyPr/>
-                    <a:lstStyle/>
-                    <a:p>
-                      <a:endParaRPr lang="en-GB" dirty="0"/>
-                    </a:p>
-                  </a:txBody>
-                  <a:tcPr/>
-                </a:tc>
-                <a:tc>
-                  <a:txBody>
-                    <a:bodyPr/>
-                    <a:lstStyle/>
-                    <a:p>
-                      <a:endParaRPr lang="en-GB" dirty="0"/>
-                    </a:p>
-                  </a:txBody>
-                  <a:tcPr/>
-                </a:tc>
-              </a:tr>
             </a:tbl>
           </a:graphicData>
         </a:graphic>
@@ -10866,14 +10925,14 @@
           <p:nvPr>
             <p:extLst>
               <p:ext uri="{D42A27DB-BD31-4B8C-83A1-F6EECF244321}">
-                <p14:modId xmlns:p14="http://schemas.microsoft.com/office/powerpoint/2010/main" val="3848696590"/>
+                <p14:modId xmlns:p14="http://schemas.microsoft.com/office/powerpoint/2010/main" val="364962478"/>
               </p:ext>
             </p:extLst>
           </p:nvPr>
         </p:nvGraphicFramePr>
         <p:xfrm>
           <a:off x="3751074" y="3237596"/>
-          <a:ext cx="7433156" cy="2377440"/>
+          <a:ext cx="7433156" cy="2743200"/>
         </p:xfrm>
         <a:graphic>
           <a:graphicData uri="http://schemas.openxmlformats.org/drawingml/2006/table">
@@ -10957,9 +11016,40 @@
                       </a:r>
                       <a:r>
                         <a:rPr lang="en-GB" baseline="0" dirty="0" smtClean="0"/>
-                        <a:t> the application login.</a:t>
+                        <a:t> the application login</a:t>
                       </a:r>
-                      <a:endParaRPr lang="en-GB" dirty="0"/>
+                      <a:r>
+                        <a:rPr lang="en-GB" baseline="0" dirty="0" smtClean="0"/>
+                        <a:t>.</a:t>
+                      </a:r>
+                    </a:p>
+                    <a:p>
+                      <a:pPr marL="0" marR="0" indent="0" algn="l" defTabSz="914400" rtl="0" eaLnBrk="1" fontAlgn="auto" latinLnBrk="0" hangingPunct="1">
+                        <a:lnSpc>
+                          <a:spcPct val="100000"/>
+                        </a:lnSpc>
+                        <a:spcBef>
+                          <a:spcPts val="0"/>
+                        </a:spcBef>
+                        <a:spcAft>
+                          <a:spcPts val="0"/>
+                        </a:spcAft>
+                        <a:buClrTx/>
+                        <a:buSzTx/>
+                        <a:buFontTx/>
+                        <a:buNone/>
+                        <a:tabLst/>
+                        <a:defRPr/>
+                      </a:pPr>
+                      <a:r>
+                        <a:rPr lang="en-GB" dirty="0" smtClean="0"/>
+                        <a:t>Jute Ron</a:t>
+                      </a:r>
+                      <a:r>
+                        <a:rPr lang="en-GB" baseline="0" dirty="0" smtClean="0"/>
+                        <a:t>, Ron Egg, Fish Simon </a:t>
+                      </a:r>
+                      <a:endParaRPr lang="en-GB" dirty="0" smtClean="0"/>
                     </a:p>
                   </a:txBody>
                   <a:tcPr/>
@@ -11019,8 +11109,37 @@
                       </a:r>
                       <a:r>
                         <a:rPr lang="en-GB" baseline="0" dirty="0" smtClean="0"/>
-                        <a:t> the login webpage for website</a:t>
+                        <a:t> the login webpage for </a:t>
                       </a:r>
+                      <a:r>
+                        <a:rPr lang="en-GB" baseline="0" dirty="0" smtClean="0"/>
+                        <a:t>website</a:t>
+                      </a:r>
+                    </a:p>
+                    <a:p>
+                      <a:pPr marL="0" marR="0" indent="0" algn="l" defTabSz="914400" rtl="0" eaLnBrk="1" fontAlgn="auto" latinLnBrk="0" hangingPunct="1">
+                        <a:lnSpc>
+                          <a:spcPct val="100000"/>
+                        </a:lnSpc>
+                        <a:spcBef>
+                          <a:spcPts val="0"/>
+                        </a:spcBef>
+                        <a:spcAft>
+                          <a:spcPts val="0"/>
+                        </a:spcAft>
+                        <a:buClrTx/>
+                        <a:buSzTx/>
+                        <a:buFontTx/>
+                        <a:buNone/>
+                        <a:tabLst/>
+                        <a:defRPr/>
+                      </a:pPr>
+                      <a:r>
+                        <a:rPr lang="en-GB" dirty="0" smtClean="0"/>
+                        <a:t>Jute Ron, Sam Smith</a:t>
+                      </a:r>
+                    </a:p>
+                    <a:p>
                       <a:endParaRPr lang="en-GB" dirty="0"/>
                     </a:p>
                   </a:txBody>
@@ -11069,90 +11188,6 @@
                   <a:tcPr/>
                 </a:tc>
               </a:tr>
-              <a:tr h="282316">
-                <a:tc>
-                  <a:txBody>
-                    <a:bodyPr/>
-                    <a:lstStyle/>
-                    <a:p>
-                      <a:endParaRPr lang="en-GB" dirty="0"/>
-                    </a:p>
-                  </a:txBody>
-                  <a:tcPr/>
-                </a:tc>
-                <a:tc>
-                  <a:txBody>
-                    <a:bodyPr/>
-                    <a:lstStyle/>
-                    <a:p>
-                      <a:endParaRPr lang="en-GB"/>
-                    </a:p>
-                  </a:txBody>
-                  <a:tcPr/>
-                </a:tc>
-                <a:tc>
-                  <a:txBody>
-                    <a:bodyPr/>
-                    <a:lstStyle/>
-                    <a:p>
-                      <a:endParaRPr lang="en-GB" dirty="0"/>
-                    </a:p>
-                  </a:txBody>
-                  <a:tcPr/>
-                </a:tc>
-                <a:tc>
-                  <a:txBody>
-                    <a:bodyPr/>
-                    <a:lstStyle/>
-                    <a:p>
-                      <a:endParaRPr lang="en-GB" dirty="0"/>
-                    </a:p>
-                  </a:txBody>
-                  <a:tcPr/>
-                </a:tc>
-              </a:tr>
-              <a:tr h="282316">
-                <a:tc>
-                  <a:txBody>
-                    <a:bodyPr/>
-                    <a:lstStyle/>
-                    <a:p>
-                      <a:endParaRPr lang="en-GB" dirty="0"/>
-                    </a:p>
-                  </a:txBody>
-                  <a:tcPr/>
-                </a:tc>
-                <a:tc>
-                  <a:txBody>
-                    <a:bodyPr/>
-                    <a:lstStyle/>
-                    <a:p>
-                      <a:endParaRPr lang="en-GB"/>
-                    </a:p>
-                  </a:txBody>
-                  <a:tcPr/>
-                </a:tc>
-                <a:tc>
-                  <a:txBody>
-                    <a:bodyPr/>
-                    <a:lstStyle/>
-                    <a:p>
-                      <a:endParaRPr lang="en-GB" dirty="0"/>
-                    </a:p>
-                  </a:txBody>
-                  <a:tcPr/>
-                </a:tc>
-                <a:tc>
-                  <a:txBody>
-                    <a:bodyPr/>
-                    <a:lstStyle/>
-                    <a:p>
-                      <a:endParaRPr lang="en-GB" dirty="0"/>
-                    </a:p>
-                  </a:txBody>
-                  <a:tcPr/>
-                </a:tc>
-              </a:tr>
             </a:tbl>
           </a:graphicData>
         </a:graphic>
@@ -12718,11 +12753,17 @@
           <p:cNvGraphicFramePr>
             <a:graphicFrameLocks/>
           </p:cNvGraphicFramePr>
-          <p:nvPr/>
+          <p:nvPr>
+            <p:extLst>
+              <p:ext uri="{D42A27DB-BD31-4B8C-83A1-F6EECF244321}">
+                <p14:modId xmlns:p14="http://schemas.microsoft.com/office/powerpoint/2010/main" val="4027753056"/>
+              </p:ext>
+            </p:extLst>
+          </p:nvPr>
         </p:nvGraphicFramePr>
         <p:xfrm>
-          <a:off x="3751074" y="3237596"/>
-          <a:ext cx="7433156" cy="2377440"/>
+          <a:off x="3751074" y="3237597"/>
+          <a:ext cx="7301936" cy="3340708"/>
         </p:xfrm>
         <a:graphic>
           <a:graphicData uri="http://schemas.openxmlformats.org/drawingml/2006/table">
@@ -12731,12 +12772,12 @@
                 <a:tableStyleId>{5C22544A-7EE6-4342-B048-85BDC9FD1C3A}</a:tableStyleId>
               </a:tblPr>
               <a:tblGrid>
-                <a:gridCol w="2600129"/>
-                <a:gridCol w="1485900"/>
-                <a:gridCol w="1488838"/>
-                <a:gridCol w="1858289"/>
+                <a:gridCol w="3114947"/>
+                <a:gridCol w="1347537"/>
+                <a:gridCol w="1604210"/>
+                <a:gridCol w="1235242"/>
               </a:tblGrid>
-              <a:tr h="282316">
+              <a:tr h="603303">
                 <a:tc>
                   <a:txBody>
                     <a:bodyPr/>
@@ -12794,7 +12835,7 @@
                   <a:tcPr/>
                 </a:tc>
               </a:tr>
-              <a:tr h="282316">
+              <a:tr h="1274365">
                 <a:tc>
                   <a:txBody>
                     <a:bodyPr/>
@@ -12806,7 +12847,27 @@
                       </a:r>
                       <a:r>
                         <a:rPr lang="en-GB" baseline="0" dirty="0" smtClean="0"/>
-                        <a:t> the application login.</a:t>
+                        <a:t> the application login</a:t>
+                      </a:r>
+                      <a:r>
+                        <a:rPr lang="en-GB" baseline="0" dirty="0" smtClean="0"/>
+                        <a:t>.</a:t>
+                      </a:r>
+                    </a:p>
+                    <a:p>
+                      <a:r>
+                        <a:rPr lang="en-GB" baseline="0" dirty="0" smtClean="0"/>
+                        <a:t>Team member: </a:t>
+                      </a:r>
+                    </a:p>
+                    <a:p>
+                      <a:r>
+                        <a:rPr lang="en-GB" dirty="0" smtClean="0"/>
+                        <a:t>Jute Ron</a:t>
+                      </a:r>
+                      <a:r>
+                        <a:rPr lang="en-GB" baseline="0" dirty="0" smtClean="0"/>
+                        <a:t>, Ron Egg, Fish Simon </a:t>
                       </a:r>
                       <a:endParaRPr lang="en-GB" dirty="0"/>
                     </a:p>
@@ -12856,7 +12917,7 @@
                   <a:tcPr/>
                 </a:tc>
               </a:tr>
-              <a:tr h="282316">
+              <a:tr h="1451641">
                 <a:tc>
                   <a:txBody>
                     <a:bodyPr/>
@@ -12868,8 +12929,26 @@
                       </a:r>
                       <a:r>
                         <a:rPr lang="en-GB" baseline="0" dirty="0" smtClean="0"/>
-                        <a:t> the login webpage for website</a:t>
+                        <a:t> the login webpage for </a:t>
                       </a:r>
+                      <a:r>
+                        <a:rPr lang="en-GB" baseline="0" dirty="0" smtClean="0"/>
+                        <a:t>website</a:t>
+                      </a:r>
+                    </a:p>
+                    <a:p>
+                      <a:r>
+                        <a:rPr lang="en-GB" baseline="0" dirty="0" smtClean="0"/>
+                        <a:t>Team member:</a:t>
+                      </a:r>
+                    </a:p>
+                    <a:p>
+                      <a:r>
+                        <a:rPr lang="en-GB" dirty="0" smtClean="0"/>
+                        <a:t>Jute Ron, Sam Smith</a:t>
+                      </a:r>
+                    </a:p>
+                    <a:p>
                       <a:endParaRPr lang="en-GB" dirty="0"/>
                     </a:p>
                   </a:txBody>
@@ -12918,90 +12997,6 @@
                   <a:tcPr/>
                 </a:tc>
               </a:tr>
-              <a:tr h="282316">
-                <a:tc>
-                  <a:txBody>
-                    <a:bodyPr/>
-                    <a:lstStyle/>
-                    <a:p>
-                      <a:endParaRPr lang="en-GB" dirty="0"/>
-                    </a:p>
-                  </a:txBody>
-                  <a:tcPr/>
-                </a:tc>
-                <a:tc>
-                  <a:txBody>
-                    <a:bodyPr/>
-                    <a:lstStyle/>
-                    <a:p>
-                      <a:endParaRPr lang="en-GB"/>
-                    </a:p>
-                  </a:txBody>
-                  <a:tcPr/>
-                </a:tc>
-                <a:tc>
-                  <a:txBody>
-                    <a:bodyPr/>
-                    <a:lstStyle/>
-                    <a:p>
-                      <a:endParaRPr lang="en-GB" dirty="0"/>
-                    </a:p>
-                  </a:txBody>
-                  <a:tcPr/>
-                </a:tc>
-                <a:tc>
-                  <a:txBody>
-                    <a:bodyPr/>
-                    <a:lstStyle/>
-                    <a:p>
-                      <a:endParaRPr lang="en-GB" dirty="0"/>
-                    </a:p>
-                  </a:txBody>
-                  <a:tcPr/>
-                </a:tc>
-              </a:tr>
-              <a:tr h="282316">
-                <a:tc>
-                  <a:txBody>
-                    <a:bodyPr/>
-                    <a:lstStyle/>
-                    <a:p>
-                      <a:endParaRPr lang="en-GB" dirty="0"/>
-                    </a:p>
-                  </a:txBody>
-                  <a:tcPr/>
-                </a:tc>
-                <a:tc>
-                  <a:txBody>
-                    <a:bodyPr/>
-                    <a:lstStyle/>
-                    <a:p>
-                      <a:endParaRPr lang="en-GB"/>
-                    </a:p>
-                  </a:txBody>
-                  <a:tcPr/>
-                </a:tc>
-                <a:tc>
-                  <a:txBody>
-                    <a:bodyPr/>
-                    <a:lstStyle/>
-                    <a:p>
-                      <a:endParaRPr lang="en-GB" dirty="0"/>
-                    </a:p>
-                  </a:txBody>
-                  <a:tcPr/>
-                </a:tc>
-                <a:tc>
-                  <a:txBody>
-                    <a:bodyPr/>
-                    <a:lstStyle/>
-                    <a:p>
-                      <a:endParaRPr lang="en-GB" dirty="0"/>
-                    </a:p>
-                  </a:txBody>
-                  <a:tcPr/>
-                </a:tc>
-              </a:tr>
             </a:tbl>
           </a:graphicData>
         </a:graphic>
@@ -13014,8 +13009,8 @@
         </p:nvSpPr>
         <p:spPr>
           <a:xfrm>
-            <a:off x="11189851" y="3559670"/>
-            <a:ext cx="327897" cy="2055366"/>
+            <a:off x="11092327" y="3628032"/>
+            <a:ext cx="295437" cy="2938871"/>
           </a:xfrm>
           <a:prstGeom prst="round1Rect">
             <a:avLst/>
@@ -13057,7 +13052,7 @@
         </p:nvSpPr>
         <p:spPr>
           <a:xfrm>
-            <a:off x="11217275" y="3716393"/>
+            <a:off x="11057271" y="3731213"/>
             <a:ext cx="298450" cy="158309"/>
           </a:xfrm>
           <a:prstGeom prst="upArrow">
@@ -13097,7 +13092,7 @@
         </p:nvSpPr>
         <p:spPr>
           <a:xfrm>
-            <a:off x="11217275" y="5361096"/>
+            <a:off x="11089314" y="6195428"/>
             <a:ext cx="298450" cy="247651"/>
           </a:xfrm>
           <a:prstGeom prst="downArrow">
@@ -13137,7 +13132,7 @@
         </p:nvSpPr>
         <p:spPr>
           <a:xfrm>
-            <a:off x="11193462" y="4394200"/>
+            <a:off x="11081376" y="4440731"/>
             <a:ext cx="314325" cy="190500"/>
           </a:xfrm>
           <a:prstGeom prst="rect">
@@ -13214,7 +13209,107 @@
       </p:sp>
       <p:sp>
         <p:nvSpPr>
-          <p:cNvPr id="3" name="Rectangle 2"/>
+          <p:cNvPr id="33" name="Rectangle 32"/>
+          <p:cNvSpPr/>
+          <p:nvPr/>
+        </p:nvSpPr>
+        <p:spPr>
+          <a:xfrm>
+            <a:off x="8266932" y="2436022"/>
+            <a:ext cx="939800" cy="275266"/>
+          </a:xfrm>
+          <a:prstGeom prst="rect">
+            <a:avLst/>
+          </a:prstGeom>
+        </p:spPr>
+        <p:style>
+          <a:lnRef idx="0">
+            <a:schemeClr val="accent6"/>
+          </a:lnRef>
+          <a:fillRef idx="3">
+            <a:schemeClr val="accent6"/>
+          </a:fillRef>
+          <a:effectRef idx="3">
+            <a:schemeClr val="accent6"/>
+          </a:effectRef>
+          <a:fontRef idx="minor">
+            <a:schemeClr val="lt1"/>
+          </a:fontRef>
+        </p:style>
+        <p:txBody>
+          <a:bodyPr rtlCol="0" anchor="ctr"/>
+          <a:lstStyle/>
+          <a:p>
+            <a:pPr algn="ctr"/>
+            <a:r>
+              <a:rPr lang="en-GB" dirty="0" smtClean="0"/>
+              <a:t>Search</a:t>
+            </a:r>
+            <a:endParaRPr lang="en-GB" dirty="0"/>
+          </a:p>
+        </p:txBody>
+      </p:sp>
+      <p:sp>
+        <p:nvSpPr>
+          <p:cNvPr id="41" name="Rounded Rectangle 40"/>
+          <p:cNvSpPr/>
+          <p:nvPr/>
+        </p:nvSpPr>
+        <p:spPr>
+          <a:xfrm>
+            <a:off x="3856565" y="2859829"/>
+            <a:ext cx="3204448" cy="377767"/>
+          </a:xfrm>
+          <a:prstGeom prst="roundRect">
+            <a:avLst/>
+          </a:prstGeom>
+          <a:solidFill>
+            <a:schemeClr val="tx1"/>
+          </a:solidFill>
+        </p:spPr>
+        <p:style>
+          <a:lnRef idx="2">
+            <a:schemeClr val="accent1">
+              <a:shade val="50000"/>
+            </a:schemeClr>
+          </a:lnRef>
+          <a:fillRef idx="1">
+            <a:schemeClr val="accent1"/>
+          </a:fillRef>
+          <a:effectRef idx="0">
+            <a:schemeClr val="accent1"/>
+          </a:effectRef>
+          <a:fontRef idx="minor">
+            <a:schemeClr val="lt1"/>
+          </a:fontRef>
+        </p:style>
+        <p:txBody>
+          <a:bodyPr rtlCol="0" anchor="ctr"/>
+          <a:lstStyle/>
+          <a:p>
+            <a:r>
+              <a:rPr lang="en-GB" sz="1400" dirty="0" smtClean="0"/>
+              <a:t> </a:t>
+            </a:r>
+            <a:r>
+              <a:rPr lang="en-GB" sz="1400" dirty="0"/>
+              <a:t>Task </a:t>
+            </a:r>
+            <a:r>
+              <a:rPr lang="en-GB" sz="1400" dirty="0" smtClean="0"/>
+              <a:t>Member: Bob Jims (Programmer</a:t>
+            </a:r>
+            <a:r>
+              <a:rPr lang="en-GB" sz="1400" dirty="0" smtClean="0"/>
+              <a:t>)</a:t>
+            </a:r>
+            <a:endParaRPr lang="en-GB" sz="1400" dirty="0" smtClean="0"/>
+          </a:p>
+        </p:txBody>
+      </p:sp>
+      <p:sp>
+        <p:nvSpPr>
+          <p:cNvPr id="43" name="Rectangle 42"/>
           <p:cNvSpPr/>
           <p:nvPr/>
         </p:nvSpPr>

</xml_diff>

<commit_message>
taskerman2 edit option added on the task status and update test specs
</commit_message>
<xml_diff>
--- a/TASKERMAN2.pptx
+++ b/TASKERMAN2.pptx
@@ -1749,10 +1749,22 @@
           <a:p>
             <a:r>
               <a:rPr lang="en-GB" baseline="0" dirty="0" smtClean="0"/>
-              <a:t>The should shown should be sorted by expected completion date.</a:t>
-            </a:r>
-          </a:p>
-          <a:p>
+              <a:t>Task should </a:t>
+            </a:r>
+            <a:r>
+              <a:rPr lang="en-GB" baseline="0" dirty="0" smtClean="0"/>
+              <a:t>be sorted by expected completion date.</a:t>
+            </a:r>
+          </a:p>
+          <a:p>
+            <a:r>
+              <a:rPr lang="en-GB" baseline="0" dirty="0" smtClean="0"/>
+              <a:t>If needs to edit, edit can be made using edit option after searching and found the task that the user wish </a:t>
+            </a:r>
+            <a:r>
+              <a:rPr lang="en-GB" baseline="0" smtClean="0"/>
+              <a:t>to edit</a:t>
+            </a:r>
             <a:endParaRPr lang="en-GB" baseline="0" dirty="0" smtClean="0"/>
           </a:p>
           <a:p>
@@ -5809,13 +5821,8 @@
             </a:r>
             <a:r>
               <a:rPr lang="en-GB" sz="1400" dirty="0" smtClean="0"/>
-              <a:t>Member: Bob Jims (Programmer</a:t>
-            </a:r>
-            <a:r>
-              <a:rPr lang="en-GB" sz="1400" dirty="0" smtClean="0"/>
-              <a:t>)</a:t>
-            </a:r>
-            <a:endParaRPr lang="en-GB" sz="1400" dirty="0" smtClean="0"/>
+              <a:t>Member: Bob Jims (Programmer)</a:t>
+            </a:r>
           </a:p>
         </p:txBody>
       </p:sp>
@@ -7482,7 +7489,7 @@
         </p:nvSpPr>
         <p:spPr>
           <a:xfrm>
-            <a:off x="9663548" y="2484852"/>
+            <a:off x="9663548" y="2436022"/>
             <a:ext cx="939800" cy="275266"/>
           </a:xfrm>
           <a:prstGeom prst="rect">
@@ -7624,11 +7631,7 @@
                       </a:r>
                       <a:r>
                         <a:rPr lang="en-GB" baseline="0" dirty="0" smtClean="0"/>
-                        <a:t> the application login</a:t>
-                      </a:r>
-                      <a:r>
-                        <a:rPr lang="en-GB" baseline="0" dirty="0" smtClean="0"/>
-                        <a:t>.</a:t>
+                        <a:t> the application login.</a:t>
                       </a:r>
                     </a:p>
                     <a:p>
@@ -7723,11 +7726,7 @@
                       </a:r>
                       <a:r>
                         <a:rPr lang="en-GB" baseline="0" dirty="0" smtClean="0"/>
-                        <a:t> the login webpage for </a:t>
-                      </a:r>
-                      <a:r>
-                        <a:rPr lang="en-GB" baseline="0" dirty="0" smtClean="0"/>
-                        <a:t>website</a:t>
+                        <a:t> the login webpage for website</a:t>
                       </a:r>
                     </a:p>
                     <a:p>
@@ -8155,6 +8154,48 @@
           <a:p>
             <a:pPr algn="ctr"/>
             <a:endParaRPr lang="en-GB"/>
+          </a:p>
+        </p:txBody>
+      </p:sp>
+      <p:sp>
+        <p:nvSpPr>
+          <p:cNvPr id="40" name="Rectangle 39"/>
+          <p:cNvSpPr/>
+          <p:nvPr/>
+        </p:nvSpPr>
+        <p:spPr>
+          <a:xfrm>
+            <a:off x="9685733" y="2822476"/>
+            <a:ext cx="939800" cy="275266"/>
+          </a:xfrm>
+          <a:prstGeom prst="rect">
+            <a:avLst/>
+          </a:prstGeom>
+        </p:spPr>
+        <p:style>
+          <a:lnRef idx="0">
+            <a:schemeClr val="accent6"/>
+          </a:lnRef>
+          <a:fillRef idx="3">
+            <a:schemeClr val="accent6"/>
+          </a:fillRef>
+          <a:effectRef idx="3">
+            <a:schemeClr val="accent6"/>
+          </a:effectRef>
+          <a:fontRef idx="minor">
+            <a:schemeClr val="lt1"/>
+          </a:fontRef>
+        </p:style>
+        <p:txBody>
+          <a:bodyPr rtlCol="0" anchor="ctr"/>
+          <a:lstStyle/>
+          <a:p>
+            <a:pPr algn="ctr"/>
+            <a:r>
+              <a:rPr lang="en-GB" dirty="0" smtClean="0"/>
+              <a:t>Edit</a:t>
+            </a:r>
+            <a:endParaRPr lang="en-GB" dirty="0"/>
           </a:p>
         </p:txBody>
       </p:sp>
@@ -9339,11 +9380,7 @@
                       </a:r>
                       <a:r>
                         <a:rPr lang="en-GB" baseline="0" dirty="0" smtClean="0"/>
-                        <a:t> the application login</a:t>
-                      </a:r>
-                      <a:r>
-                        <a:rPr lang="en-GB" baseline="0" dirty="0" smtClean="0"/>
-                        <a:t>.</a:t>
+                        <a:t> the application login.</a:t>
                       </a:r>
                     </a:p>
                     <a:p>
@@ -9438,11 +9475,7 @@
                       </a:r>
                       <a:r>
                         <a:rPr lang="en-GB" baseline="0" dirty="0" smtClean="0"/>
-                        <a:t> the login webpage for </a:t>
-                      </a:r>
-                      <a:r>
-                        <a:rPr lang="en-GB" baseline="0" dirty="0" smtClean="0"/>
-                        <a:t>website</a:t>
+                        <a:t> the login webpage for website</a:t>
                       </a:r>
                     </a:p>
                     <a:p>
@@ -11016,11 +11049,7 @@
                       </a:r>
                       <a:r>
                         <a:rPr lang="en-GB" baseline="0" dirty="0" smtClean="0"/>
-                        <a:t> the application login</a:t>
-                      </a:r>
-                      <a:r>
-                        <a:rPr lang="en-GB" baseline="0" dirty="0" smtClean="0"/>
-                        <a:t>.</a:t>
+                        <a:t> the application login.</a:t>
                       </a:r>
                     </a:p>
                     <a:p>
@@ -11109,11 +11138,7 @@
                       </a:r>
                       <a:r>
                         <a:rPr lang="en-GB" baseline="0" dirty="0" smtClean="0"/>
-                        <a:t> the login webpage for </a:t>
-                      </a:r>
-                      <a:r>
-                        <a:rPr lang="en-GB" baseline="0" dirty="0" smtClean="0"/>
-                        <a:t>website</a:t>
+                        <a:t> the login webpage for website</a:t>
                       </a:r>
                     </a:p>
                     <a:p>
@@ -12847,11 +12872,7 @@
                       </a:r>
                       <a:r>
                         <a:rPr lang="en-GB" baseline="0" dirty="0" smtClean="0"/>
-                        <a:t> the application login</a:t>
-                      </a:r>
-                      <a:r>
-                        <a:rPr lang="en-GB" baseline="0" dirty="0" smtClean="0"/>
-                        <a:t>.</a:t>
+                        <a:t> the application login.</a:t>
                       </a:r>
                     </a:p>
                     <a:p>
@@ -12929,11 +12950,7 @@
                       </a:r>
                       <a:r>
                         <a:rPr lang="en-GB" baseline="0" dirty="0" smtClean="0"/>
-                        <a:t> the login webpage for </a:t>
-                      </a:r>
-                      <a:r>
-                        <a:rPr lang="en-GB" baseline="0" dirty="0" smtClean="0"/>
-                        <a:t>website</a:t>
+                        <a:t> the login webpage for website</a:t>
                       </a:r>
                     </a:p>
                     <a:p>
@@ -13297,13 +13314,8 @@
             </a:r>
             <a:r>
               <a:rPr lang="en-GB" sz="1400" dirty="0" smtClean="0"/>
-              <a:t>Member: Bob Jims (Programmer</a:t>
-            </a:r>
-            <a:r>
-              <a:rPr lang="en-GB" sz="1400" dirty="0" smtClean="0"/>
-              <a:t>)</a:t>
-            </a:r>
-            <a:endParaRPr lang="en-GB" sz="1400" dirty="0" smtClean="0"/>
+              <a:t>Member: Bob Jims (Programmer)</a:t>
+            </a:r>
           </a:p>
         </p:txBody>
       </p:sp>
@@ -13378,6 +13390,48 @@
                 <a:schemeClr val="tx1"/>
               </a:solidFill>
             </a:endParaRPr>
+          </a:p>
+        </p:txBody>
+      </p:sp>
+      <p:sp>
+        <p:nvSpPr>
+          <p:cNvPr id="39" name="Rectangle 38"/>
+          <p:cNvSpPr/>
+          <p:nvPr/>
+        </p:nvSpPr>
+        <p:spPr>
+          <a:xfrm>
+            <a:off x="9685733" y="2822476"/>
+            <a:ext cx="939800" cy="275266"/>
+          </a:xfrm>
+          <a:prstGeom prst="rect">
+            <a:avLst/>
+          </a:prstGeom>
+        </p:spPr>
+        <p:style>
+          <a:lnRef idx="0">
+            <a:schemeClr val="accent6"/>
+          </a:lnRef>
+          <a:fillRef idx="3">
+            <a:schemeClr val="accent6"/>
+          </a:fillRef>
+          <a:effectRef idx="3">
+            <a:schemeClr val="accent6"/>
+          </a:effectRef>
+          <a:fontRef idx="minor">
+            <a:schemeClr val="lt1"/>
+          </a:fontRef>
+        </p:style>
+        <p:txBody>
+          <a:bodyPr rtlCol="0" anchor="ctr"/>
+          <a:lstStyle/>
+          <a:p>
+            <a:pPr algn="ctr"/>
+            <a:r>
+              <a:rPr lang="en-GB" dirty="0" smtClean="0"/>
+              <a:t>Edit</a:t>
+            </a:r>
+            <a:endParaRPr lang="en-GB" dirty="0"/>
           </a:p>
         </p:txBody>
       </p:sp>

</xml_diff>